<commit_message>
Update presentation from Mantid Release 3.2
</commit_message>
<xml_diff>
--- a/RAL/Release 3.2 Presentation.pptx
+++ b/RAL/Release 3.2 Presentation.pptx
@@ -3938,15 +3938,63 @@
             <p:ph idx="1"/>
           </p:nvPr>
         </p:nvSpPr>
-        <p:spPr/>
+        <p:spPr>
+          <a:xfrm>
+            <a:off x="457200" y="1239838"/>
+            <a:ext cx="4258816" cy="4205287"/>
+          </a:xfrm>
+        </p:spPr>
         <p:txBody>
           <a:bodyPr/>
           <a:lstStyle/>
           <a:p>
             <a:r>
               <a:rPr lang="en-GB" dirty="0" smtClean="0"/>
-              <a:t>No more black boxes</a:t>
-            </a:r>
+              <a:t>No more black </a:t>
+            </a:r>
+            <a:r>
+              <a:rPr lang="en-GB" dirty="0" smtClean="0"/>
+              <a:t>boxes</a:t>
+            </a:r>
+          </a:p>
+          <a:p>
+            <a:pPr lvl="1"/>
+            <a:r>
+              <a:rPr lang="en-GB" dirty="0" smtClean="0"/>
+              <a:t>Records algorithms run and parameters used</a:t>
+            </a:r>
+            <a:endParaRPr lang="en-GB" dirty="0" smtClean="0"/>
+          </a:p>
+          <a:p>
+            <a:r>
+              <a:rPr lang="en-GB" dirty="0" smtClean="0"/>
+              <a:t>Distinction:</a:t>
+            </a:r>
+          </a:p>
+          <a:p>
+            <a:pPr lvl="1"/>
+            <a:r>
+              <a:rPr lang="en-GB" dirty="0" smtClean="0"/>
+              <a:t>Algorithms vs. Work-flow algorithms</a:t>
+            </a:r>
+          </a:p>
+          <a:p>
+            <a:r>
+              <a:rPr lang="en-GB" dirty="0" smtClean="0"/>
+              <a:t>Script generation from history</a:t>
+            </a:r>
+          </a:p>
+          <a:p>
+            <a:pPr lvl="1"/>
+            <a:r>
+              <a:rPr lang="en-GB" dirty="0" smtClean="0"/>
+              <a:t>To any level of depth</a:t>
+            </a:r>
+          </a:p>
+          <a:p>
+            <a:pPr marL="457200" lvl="1" indent="0">
+              <a:buNone/>
+            </a:pPr>
             <a:endParaRPr lang="en-GB" dirty="0"/>
           </a:p>
           <a:p>

</xml_diff>

<commit_message>
Update release presentation for Mantid 3.2.
</commit_message>
<xml_diff>
--- a/RAL/Release 3.2 Presentation.pptx
+++ b/RAL/Release 3.2 Presentation.pptx
@@ -3950,11 +3950,7 @@
           <a:p>
             <a:r>
               <a:rPr lang="en-GB" dirty="0" smtClean="0"/>
-              <a:t>No more black </a:t>
-            </a:r>
-            <a:r>
-              <a:rPr lang="en-GB" dirty="0" smtClean="0"/>
-              <a:t>boxes</a:t>
+              <a:t>No more black boxes</a:t>
             </a:r>
           </a:p>
           <a:p>
@@ -3963,7 +3959,6 @@
               <a:rPr lang="en-GB" dirty="0" smtClean="0"/>
               <a:t>Records algorithms run and parameters used</a:t>
             </a:r>
-            <a:endParaRPr lang="en-GB" dirty="0" smtClean="0"/>
           </a:p>
           <a:p>
             <a:r>
@@ -3988,8 +3983,19 @@
             <a:pPr lvl="1"/>
             <a:r>
               <a:rPr lang="en-GB" dirty="0" smtClean="0"/>
-              <a:t>To any level of depth</a:t>
-            </a:r>
+              <a:t>To any level of </a:t>
+            </a:r>
+            <a:r>
+              <a:rPr lang="en-GB" dirty="0" smtClean="0"/>
+              <a:t>depth</a:t>
+            </a:r>
+          </a:p>
+          <a:p>
+            <a:r>
+              <a:rPr lang="en-GB" dirty="0" smtClean="0"/>
+              <a:t>History available through the Python API</a:t>
+            </a:r>
+            <a:endParaRPr lang="en-GB" dirty="0" smtClean="0"/>
           </a:p>
           <a:p>
             <a:pPr marL="457200" lvl="1" indent="0">

</xml_diff>